<commit_message>
Finished report, presentation and added code to end of report
</commit_message>
<xml_diff>
--- a/Project3/Reports/Project 3 Final Presentation.pptx
+++ b/Project3/Reports/Project 3 Final Presentation.pptx
@@ -3086,14 +3086,7 @@
                 <a:latin typeface="Times New Roman" panose="02020603050405020304" pitchFamily="18" charset="0"/>
                 <a:cs typeface="Times New Roman" panose="02020603050405020304" pitchFamily="18" charset="0"/>
               </a:rPr>
-              <a:t>Data </a:t>
-            </a:r>
-            <a:r>
-              <a:rPr lang="en-US" dirty="0" smtClean="0">
-                <a:latin typeface="Times New Roman" panose="02020603050405020304" pitchFamily="18" charset="0"/>
-                <a:cs typeface="Times New Roman" panose="02020603050405020304" pitchFamily="18" charset="0"/>
-              </a:rPr>
-              <a:t>Summary</a:t>
+              <a:t>Data Summary</a:t>
             </a:r>
             <a:endParaRPr lang="en-US" dirty="0">
               <a:latin typeface="Times New Roman" panose="02020603050405020304" pitchFamily="18" charset="0"/>
@@ -3129,14 +3122,7 @@
                 <a:latin typeface="Times New Roman" panose="02020603050405020304" pitchFamily="18" charset="0"/>
                 <a:cs typeface="Times New Roman" panose="02020603050405020304" pitchFamily="18" charset="0"/>
               </a:rPr>
-              <a:t>Goal: identify trajectory of </a:t>
-            </a:r>
-            <a:r>
-              <a:rPr lang="en-US" sz="3200" dirty="0" smtClean="0">
-                <a:latin typeface="Times New Roman" panose="02020603050405020304" pitchFamily="18" charset="0"/>
-                <a:cs typeface="Times New Roman" panose="02020603050405020304" pitchFamily="18" charset="0"/>
-              </a:rPr>
-              <a:t>onset of memory/cognitive loss in healthy, cognitively-intact elders</a:t>
+              <a:t>Goal: identify trajectory of onset of memory/cognitive loss in healthy, cognitively-intact elders</a:t>
             </a:r>
           </a:p>
           <a:p>
@@ -3278,7 +3264,7 @@
         </p:nvGraphicFramePr>
         <p:xfrm>
           <a:off x="385763" y="408211"/>
-          <a:ext cx="11472861" cy="5749702"/>
+          <a:ext cx="11472861" cy="5776055"/>
         </p:xfrm>
         <a:graphic>
           <a:graphicData uri="http://schemas.openxmlformats.org/drawingml/2006/table">
@@ -7243,10 +7229,6 @@
               </a:rPr>
               <a:t>Found new standard errors, p-values from estimates from model</a:t>
             </a:r>
-            <a:endParaRPr lang="en-US" dirty="0" smtClean="0">
-              <a:latin typeface="Times New Roman" panose="02020603050405020304" pitchFamily="18" charset="0"/>
-              <a:cs typeface="Times New Roman" panose="02020603050405020304" pitchFamily="18" charset="0"/>
-            </a:endParaRPr>
           </a:p>
         </p:txBody>
       </p:sp>
@@ -7323,42 +7305,42 @@
           <p:nvPr>
             <p:extLst>
               <p:ext uri="{D42A27DB-BD31-4B8C-83A1-F6EECF244321}">
-                <p14:modId xmlns:p14="http://schemas.microsoft.com/office/powerpoint/2010/main" val="3006168614"/>
+                <p14:modId xmlns:p14="http://schemas.microsoft.com/office/powerpoint/2010/main" val="3847958364"/>
               </p:ext>
             </p:extLst>
           </p:nvPr>
         </p:nvGraphicFramePr>
         <p:xfrm>
-          <a:off x="2679699" y="1308255"/>
-          <a:ext cx="7300912" cy="3763605"/>
+          <a:off x="531018" y="1229667"/>
+          <a:ext cx="11129962" cy="3763605"/>
         </p:xfrm>
         <a:graphic>
           <a:graphicData uri="http://schemas.openxmlformats.org/drawingml/2006/table">
             <a:tbl>
               <a:tblPr firstRow="1" firstCol="1" bandRow="1"/>
               <a:tblGrid>
-                <a:gridCol w="1908516">
+                <a:gridCol w="2909460">
                   <a:extLst>
                     <a:ext uri="{9D8B030D-6E8A-4147-A177-3AD203B41FA5}">
                       <a16:colId xmlns:a16="http://schemas.microsoft.com/office/drawing/2014/main" val="369689997"/>
                     </a:ext>
                   </a:extLst>
                 </a:gridCol>
-                <a:gridCol w="1536968">
+                <a:gridCol w="2343049">
                   <a:extLst>
                     <a:ext uri="{9D8B030D-6E8A-4147-A177-3AD203B41FA5}">
                       <a16:colId xmlns:a16="http://schemas.microsoft.com/office/drawing/2014/main" val="2369813195"/>
                     </a:ext>
                   </a:extLst>
                 </a:gridCol>
-                <a:gridCol w="2467077">
+                <a:gridCol w="3760965">
                   <a:extLst>
                     <a:ext uri="{9D8B030D-6E8A-4147-A177-3AD203B41FA5}">
                       <a16:colId xmlns:a16="http://schemas.microsoft.com/office/drawing/2014/main" val="472369909"/>
                     </a:ext>
                   </a:extLst>
                 </a:gridCol>
-                <a:gridCol w="1388351">
+                <a:gridCol w="2116488">
                   <a:extLst>
                     <a:ext uri="{9D8B030D-6E8A-4147-A177-3AD203B41FA5}">
                       <a16:colId xmlns:a16="http://schemas.microsoft.com/office/drawing/2014/main" val="2747846679"/>
@@ -7917,7 +7899,7 @@
                         </a:spcAft>
                       </a:pPr>
                       <a:r>
-                        <a:rPr lang="en-US" sz="2400">
+                        <a:rPr lang="en-US" sz="2400" dirty="0">
                           <a:solidFill>
                             <a:srgbClr val="000000"/>
                           </a:solidFill>
@@ -7927,7 +7909,7 @@
                         </a:rPr>
                         <a:t>-0.93</a:t>
                       </a:r>
-                      <a:endParaRPr lang="en-US" sz="2800">
+                      <a:endParaRPr lang="en-US" sz="2800" dirty="0">
                         <a:effectLst/>
                         <a:latin typeface="Times New Roman" panose="02020603050405020304" pitchFamily="18" charset="0"/>
                         <a:ea typeface="Calibri" panose="020F0502020204030204" pitchFamily="34" charset="0"/>
@@ -8077,17 +8059,17 @@
                         </a:spcAft>
                       </a:pPr>
                       <a:r>
-                        <a:rPr lang="en-US" sz="2400">
-                          <a:solidFill>
-                            <a:srgbClr val="000000"/>
-                          </a:solidFill>
-                          <a:effectLst/>
-                          <a:latin typeface="Times New Roman" panose="02020603050405020304" pitchFamily="18" charset="0"/>
-                          <a:ea typeface="Times New Roman" panose="02020603050405020304" pitchFamily="18" charset="0"/>
-                        </a:rPr>
-                        <a:t>Gender</a:t>
-                      </a:r>
-                      <a:endParaRPr lang="en-US" sz="2800">
+                        <a:rPr lang="en-US" sz="2400" dirty="0" smtClean="0">
+                          <a:solidFill>
+                            <a:srgbClr val="000000"/>
+                          </a:solidFill>
+                          <a:effectLst/>
+                          <a:latin typeface="Times New Roman" panose="02020603050405020304" pitchFamily="18" charset="0"/>
+                          <a:ea typeface="Times New Roman" panose="02020603050405020304" pitchFamily="18" charset="0"/>
+                        </a:rPr>
+                        <a:t>Gender (ref = M)</a:t>
+                      </a:r>
+                      <a:endParaRPr lang="en-US" sz="2800" dirty="0">
                         <a:effectLst/>
                         <a:latin typeface="Times New Roman" panose="02020603050405020304" pitchFamily="18" charset="0"/>
                         <a:ea typeface="Calibri" panose="020F0502020204030204" pitchFamily="34" charset="0"/>
@@ -8132,7 +8114,7 @@
                         </a:spcAft>
                       </a:pPr>
                       <a:r>
-                        <a:rPr lang="en-US" sz="2400">
+                        <a:rPr lang="en-US" sz="2400" dirty="0">
                           <a:solidFill>
                             <a:srgbClr val="000000"/>
                           </a:solidFill>
@@ -8142,7 +8124,7 @@
                         </a:rPr>
                         <a:t>-0.56</a:t>
                       </a:r>
-                      <a:endParaRPr lang="en-US" sz="2800">
+                      <a:endParaRPr lang="en-US" sz="2800" dirty="0">
                         <a:effectLst/>
                         <a:latin typeface="Times New Roman" panose="02020603050405020304" pitchFamily="18" charset="0"/>
                         <a:ea typeface="Calibri" panose="020F0502020204030204" pitchFamily="34" charset="0"/>
@@ -8347,7 +8329,7 @@
                         </a:spcAft>
                       </a:pPr>
                       <a:r>
-                        <a:rPr lang="en-US" sz="2400">
+                        <a:rPr lang="en-US" sz="2400" dirty="0">
                           <a:solidFill>
                             <a:srgbClr val="000000"/>
                           </a:solidFill>
@@ -8357,7 +8339,7 @@
                         </a:rPr>
                         <a:t>0.04</a:t>
                       </a:r>
-                      <a:endParaRPr lang="en-US" sz="2800">
+                      <a:endParaRPr lang="en-US" sz="2800" dirty="0">
                         <a:effectLst/>
                         <a:latin typeface="Times New Roman" panose="02020603050405020304" pitchFamily="18" charset="0"/>
                         <a:ea typeface="Calibri" panose="020F0502020204030204" pitchFamily="34" charset="0"/>
@@ -8722,17 +8704,17 @@
                         </a:spcAft>
                       </a:pPr>
                       <a:r>
-                        <a:rPr lang="en-US" sz="2400">
-                          <a:solidFill>
-                            <a:srgbClr val="000000"/>
-                          </a:solidFill>
-                          <a:effectLst/>
-                          <a:latin typeface="Times New Roman" panose="02020603050405020304" pitchFamily="18" charset="0"/>
-                          <a:ea typeface="Times New Roman" panose="02020603050405020304" pitchFamily="18" charset="0"/>
-                        </a:rPr>
-                        <a:t>Dementia</a:t>
-                      </a:r>
-                      <a:endParaRPr lang="en-US" sz="2800">
+                        <a:rPr lang="en-US" sz="2400" dirty="0" smtClean="0">
+                          <a:solidFill>
+                            <a:srgbClr val="000000"/>
+                          </a:solidFill>
+                          <a:effectLst/>
+                          <a:latin typeface="Times New Roman" panose="02020603050405020304" pitchFamily="18" charset="0"/>
+                          <a:ea typeface="Times New Roman" panose="02020603050405020304" pitchFamily="18" charset="0"/>
+                        </a:rPr>
+                        <a:t>Dementia (ref = 0)</a:t>
+                      </a:r>
+                      <a:endParaRPr lang="en-US" sz="2800" dirty="0">
                         <a:effectLst/>
                         <a:latin typeface="Times New Roman" panose="02020603050405020304" pitchFamily="18" charset="0"/>
                         <a:ea typeface="Calibri" panose="020F0502020204030204" pitchFamily="34" charset="0"/>
@@ -8777,7 +8759,7 @@
                         </a:spcAft>
                       </a:pPr>
                       <a:r>
-                        <a:rPr lang="en-US" sz="2400">
+                        <a:rPr lang="en-US" sz="2400" dirty="0">
                           <a:solidFill>
                             <a:srgbClr val="000000"/>
                           </a:solidFill>
@@ -8787,7 +8769,7 @@
                         </a:rPr>
                         <a:t>-4.39</a:t>
                       </a:r>
-                      <a:endParaRPr lang="en-US" sz="2800">
+                      <a:endParaRPr lang="en-US" sz="2800" dirty="0">
                         <a:effectLst/>
                         <a:latin typeface="Times New Roman" panose="02020603050405020304" pitchFamily="18" charset="0"/>
                         <a:ea typeface="Calibri" panose="020F0502020204030204" pitchFamily="34" charset="0"/>
@@ -8998,7 +8980,7 @@
                         </a:spcAft>
                       </a:pPr>
                       <a:r>
-                        <a:rPr lang="en-US" sz="2400">
+                        <a:rPr lang="en-US" sz="2400" dirty="0">
                           <a:solidFill>
                             <a:srgbClr val="000000"/>
                           </a:solidFill>
@@ -9008,7 +8990,7 @@
                         </a:rPr>
                         <a:t>0.01</a:t>
                       </a:r>
-                      <a:endParaRPr lang="en-US" sz="2800">
+                      <a:endParaRPr lang="en-US" sz="2800" dirty="0">
                         <a:effectLst/>
                         <a:latin typeface="Times New Roman" panose="02020603050405020304" pitchFamily="18" charset="0"/>
                         <a:ea typeface="Calibri" panose="020F0502020204030204" pitchFamily="34" charset="0"/>
@@ -9650,7 +9632,7 @@
         <p:spPr>
           <a:xfrm>
             <a:off x="838200" y="1428750"/>
-            <a:ext cx="10515600" cy="5057775"/>
+            <a:ext cx="10515600" cy="5429250"/>
           </a:xfrm>
         </p:spPr>
         <p:txBody>
@@ -9691,10 +9673,46 @@
               <a:t>M</a:t>
             </a:r>
             <a:r>
+              <a:rPr lang="en-US" dirty="0">
+                <a:latin typeface="Times New Roman" panose="02020603050405020304" pitchFamily="18" charset="0"/>
+              </a:rPr>
+              <a:t>ean decrease of 0.18 points per 1 year increase in age (95% CI: -0.24, -0.12</a:t>
+            </a:r>
+            <a:r>
               <a:rPr lang="en-US" dirty="0" smtClean="0">
                 <a:latin typeface="Times New Roman" panose="02020603050405020304" pitchFamily="18" charset="0"/>
               </a:rPr>
-              <a:t>ean decrease of 0.18 points per 1 year increase in age (95% CI: -0.24, -0.12)</a:t>
+              <a:t>)</a:t>
+            </a:r>
+            <a:endParaRPr lang="en-US" dirty="0" smtClean="0">
+              <a:latin typeface="Times New Roman" panose="02020603050405020304" pitchFamily="18" charset="0"/>
+              <a:cs typeface="Times New Roman" panose="02020603050405020304" pitchFamily="18" charset="0"/>
+            </a:endParaRPr>
+          </a:p>
+          <a:p>
+            <a:r>
+              <a:rPr lang="en-US" dirty="0">
+                <a:latin typeface="Times New Roman" panose="02020603050405020304" pitchFamily="18" charset="0"/>
+                <a:cs typeface="Times New Roman" panose="02020603050405020304" pitchFamily="18" charset="0"/>
+              </a:rPr>
+              <a:t>What is the rate of memory decline based on these measures over the aging process in those diagnosed with MCI/dementia during the study</a:t>
+            </a:r>
+            <a:r>
+              <a:rPr lang="en-US" dirty="0" smtClean="0">
+                <a:latin typeface="Times New Roman" panose="02020603050405020304" pitchFamily="18" charset="0"/>
+                <a:cs typeface="Times New Roman" panose="02020603050405020304" pitchFamily="18" charset="0"/>
+              </a:rPr>
+              <a:t>?</a:t>
+            </a:r>
+          </a:p>
+          <a:p>
+            <a:pPr lvl="1"/>
+            <a:r>
+              <a:rPr lang="en-US" dirty="0" smtClean="0">
+                <a:latin typeface="Times New Roman" panose="02020603050405020304" pitchFamily="18" charset="0"/>
+                <a:cs typeface="Times New Roman" panose="02020603050405020304" pitchFamily="18" charset="0"/>
+              </a:rPr>
+              <a:t>Mean decrease of 0.17 points per 1 year increase in age before change-point</a:t>
             </a:r>
           </a:p>
           <a:p>
@@ -9703,14 +9721,9 @@
               <a:rPr lang="en-US" dirty="0" smtClean="0">
                 <a:latin typeface="Times New Roman" panose="02020603050405020304" pitchFamily="18" charset="0"/>
               </a:rPr>
-              <a:t>Insignificant interaction between age and dementia, so no significant difference in memory decrease for those with dementia/MCI</a:t>
+              <a:t>Mean decrease of 0.17+0.93 = 1.10 points per 1 year age increase after</a:t>
             </a:r>
-          </a:p>
-          <a:p>
-            <a:pPr marL="457200" lvl="1" indent="0">
-              <a:buNone/>
-            </a:pPr>
-            <a:endParaRPr lang="en-US" sz="1200" dirty="0" smtClean="0">
+            <a:endParaRPr lang="en-US" dirty="0">
               <a:latin typeface="Times New Roman" panose="02020603050405020304" pitchFamily="18" charset="0"/>
             </a:endParaRPr>
           </a:p>
@@ -9748,52 +9761,40 @@
             </a:r>
           </a:p>
           <a:p>
-            <a:pPr marL="457200" lvl="1" indent="0">
-              <a:buNone/>
-            </a:pPr>
-            <a:endParaRPr lang="en-US" sz="1200" dirty="0">
-              <a:latin typeface="Times New Roman" panose="02020603050405020304" pitchFamily="18" charset="0"/>
-              <a:cs typeface="Times New Roman" panose="02020603050405020304" pitchFamily="18" charset="0"/>
-            </a:endParaRPr>
-          </a:p>
-          <a:p>
             <a:r>
               <a:rPr lang="en-US" dirty="0" smtClean="0">
                 <a:latin typeface="Times New Roman" panose="02020603050405020304" pitchFamily="18" charset="0"/>
                 <a:cs typeface="Times New Roman" panose="02020603050405020304" pitchFamily="18" charset="0"/>
               </a:rPr>
-              <a:t>Limitations</a:t>
-            </a:r>
-          </a:p>
-          <a:p>
-            <a:pPr lvl="1"/>
-            <a:r>
-              <a:rPr lang="en-US" dirty="0" smtClean="0">
-                <a:latin typeface="Times New Roman" panose="02020603050405020304" pitchFamily="18" charset="0"/>
-                <a:cs typeface="Times New Roman" panose="02020603050405020304" pitchFamily="18" charset="0"/>
-              </a:rPr>
-              <a:t>Had to have 3 data </a:t>
+              <a:t>Limitations: had </a:t>
             </a:r>
             <a:r>
               <a:rPr lang="en-US" dirty="0" smtClean="0">
                 <a:latin typeface="Times New Roman" panose="02020603050405020304" pitchFamily="18" charset="0"/>
                 <a:cs typeface="Times New Roman" panose="02020603050405020304" pitchFamily="18" charset="0"/>
               </a:rPr>
-              <a:t>points for outcome measurement </a:t>
+              <a:t>to have 3 data points for outcome </a:t>
             </a:r>
             <a:r>
               <a:rPr lang="en-US" dirty="0" smtClean="0">
                 <a:latin typeface="Times New Roman" panose="02020603050405020304" pitchFamily="18" charset="0"/>
                 <a:cs typeface="Times New Roman" panose="02020603050405020304" pitchFamily="18" charset="0"/>
               </a:rPr>
-              <a:t>to be included in </a:t>
+              <a:t>to </a:t>
             </a:r>
             <a:r>
               <a:rPr lang="en-US" dirty="0" smtClean="0">
                 <a:latin typeface="Times New Roman" panose="02020603050405020304" pitchFamily="18" charset="0"/>
                 <a:cs typeface="Times New Roman" panose="02020603050405020304" pitchFamily="18" charset="0"/>
               </a:rPr>
-              <a:t>study</a:t>
+              <a:t>be </a:t>
+            </a:r>
+            <a:r>
+              <a:rPr lang="en-US" dirty="0" smtClean="0">
+                <a:latin typeface="Times New Roman" panose="02020603050405020304" pitchFamily="18" charset="0"/>
+                <a:cs typeface="Times New Roman" panose="02020603050405020304" pitchFamily="18" charset="0"/>
+              </a:rPr>
+              <a:t>included</a:t>
             </a:r>
             <a:endParaRPr lang="en-US" dirty="0" smtClean="0">
               <a:latin typeface="Times New Roman" panose="02020603050405020304" pitchFamily="18" charset="0"/>

</xml_diff>